<commit_message>
Swap vocabulary of chapter 5 with 1
</commit_message>
<xml_diff>
--- a/slides/01 - Chapter 1 - Clean code.pptx
+++ b/slides/01 - Chapter 1 - Clean code.pptx
@@ -5,7 +5,7 @@
     <p:sldMasterId id="2147483648" r:id="rId1"/>
   </p:sldMasterIdLst>
   <p:notesMasterIdLst>
-    <p:notesMasterId r:id="rId14"/>
+    <p:notesMasterId r:id="rId13"/>
   </p:notesMasterIdLst>
   <p:sldIdLst>
     <p:sldId id="256" r:id="rId2"/>
@@ -17,9 +17,8 @@
     <p:sldId id="263" r:id="rId8"/>
     <p:sldId id="264" r:id="rId9"/>
     <p:sldId id="265" r:id="rId10"/>
-    <p:sldId id="269" r:id="rId11"/>
-    <p:sldId id="268" r:id="rId12"/>
-    <p:sldId id="267" r:id="rId13"/>
+    <p:sldId id="301" r:id="rId11"/>
+    <p:sldId id="267" r:id="rId12"/>
   </p:sldIdLst>
   <p:sldSz cx="12192000" cy="6858000"/>
   <p:notesSz cx="12192000" cy="6858000"/>
@@ -219,7 +218,7 @@
           <a:p>
             <a:fld id="{A0DF8953-481F-496C-ADC6-D46D9197729B}" type="datetimeFigureOut">
               <a:rPr lang="en-US" smtClean="0"/>
-              <a:t>12/23/2020</a:t>
+              <a:t>4/10/2021</a:t>
             </a:fld>
             <a:endParaRPr lang="en-US"/>
           </a:p>
@@ -283,38 +282,37 @@
           <a:p>
             <a:pPr lvl="0"/>
             <a:r>
-              <a:rPr lang="en-US" smtClean="0"/>
+              <a:rPr lang="en-US"/>
               <a:t>Edit Master text styles</a:t>
             </a:r>
           </a:p>
           <a:p>
             <a:pPr lvl="1"/>
             <a:r>
-              <a:rPr lang="en-US" smtClean="0"/>
+              <a:rPr lang="en-US"/>
               <a:t>Second level</a:t>
             </a:r>
           </a:p>
           <a:p>
             <a:pPr lvl="2"/>
             <a:r>
-              <a:rPr lang="en-US" smtClean="0"/>
+              <a:rPr lang="en-US"/>
               <a:t>Third level</a:t>
             </a:r>
           </a:p>
           <a:p>
             <a:pPr lvl="3"/>
             <a:r>
-              <a:rPr lang="en-US" smtClean="0"/>
+              <a:rPr lang="en-US"/>
               <a:t>Fourth level</a:t>
             </a:r>
           </a:p>
           <a:p>
             <a:pPr lvl="4"/>
             <a:r>
-              <a:rPr lang="en-US" smtClean="0"/>
+              <a:rPr lang="en-US"/>
               <a:t>Fifth level</a:t>
             </a:r>
-            <a:endParaRPr lang="en-US"/>
           </a:p>
         </p:txBody>
       </p:sp>
@@ -536,7 +534,7 @@
               <a:buChar char="-"/>
             </a:pPr>
             <a:r>
-              <a:rPr lang="x-none" sz="1200" kern="1200" dirty="0" smtClean="0">
+              <a:rPr lang="x-none" sz="1200" kern="1200" dirty="0">
                 <a:solidFill>
                   <a:schemeClr val="tx1"/>
                 </a:solidFill>
@@ -548,7 +546,7 @@
               <a:t>The managers and marketers look to us for the information they need to make</a:t>
             </a:r>
             <a:r>
-              <a:rPr lang="en-US" sz="1200" kern="1200" baseline="0" dirty="0" smtClean="0">
+              <a:rPr lang="en-US" sz="1200" kern="1200" baseline="0" dirty="0">
                 <a:solidFill>
                   <a:schemeClr val="tx1"/>
                 </a:solidFill>
@@ -560,7 +558,7 @@
               <a:t> </a:t>
             </a:r>
             <a:r>
-              <a:rPr lang="x-none" sz="1200" b="1" kern="1200" dirty="0" smtClean="0">
+              <a:rPr lang="x-none" sz="1200" b="1" kern="1200" dirty="0">
                 <a:solidFill>
                   <a:schemeClr val="tx1"/>
                 </a:solidFill>
@@ -572,7 +570,7 @@
               <a:t>promises</a:t>
             </a:r>
             <a:r>
-              <a:rPr lang="x-none" sz="1200" kern="1200" dirty="0" smtClean="0">
+              <a:rPr lang="x-none" sz="1200" kern="1200" dirty="0">
                 <a:solidFill>
                   <a:schemeClr val="tx1"/>
                 </a:solidFill>
@@ -584,7 +582,7 @@
               <a:t> and </a:t>
             </a:r>
             <a:r>
-              <a:rPr lang="x-none" sz="1200" b="1" kern="1200" dirty="0" smtClean="0">
+              <a:rPr lang="x-none" sz="1200" b="1" kern="1200" dirty="0">
                 <a:solidFill>
                   <a:schemeClr val="tx1"/>
                 </a:solidFill>
@@ -595,7 +593,7 @@
               </a:rPr>
               <a:t>commitments</a:t>
             </a:r>
-            <a:endParaRPr lang="en-US" sz="1200" b="1" kern="1200" dirty="0" smtClean="0">
+            <a:endParaRPr lang="en-US" sz="1200" b="1" kern="1200" dirty="0">
               <a:solidFill>
                 <a:schemeClr val="tx1"/>
               </a:solidFill>
@@ -611,7 +609,7 @@
               <a:buChar char="-"/>
             </a:pPr>
             <a:r>
-              <a:rPr lang="x-none" sz="1200" kern="1200" dirty="0" smtClean="0">
+              <a:rPr lang="x-none" sz="1200" kern="1200" dirty="0">
                 <a:solidFill>
                   <a:schemeClr val="tx1"/>
                 </a:solidFill>
@@ -623,7 +621,7 @@
               <a:t>It is unprofessional for programmers to bend to the will of managers who don’t </a:t>
             </a:r>
             <a:r>
-              <a:rPr lang="en-US" sz="1200" kern="1200" dirty="0" smtClean="0">
+              <a:rPr lang="en-US" sz="1200" kern="1200" dirty="0">
                 <a:solidFill>
                   <a:schemeClr val="tx1"/>
                 </a:solidFill>
@@ -635,7 +633,7 @@
               <a:t>understand the </a:t>
             </a:r>
             <a:r>
-              <a:rPr lang="en-US" sz="1200" b="1" kern="1200" dirty="0" smtClean="0">
+              <a:rPr lang="en-US" sz="1200" b="1" kern="1200" dirty="0">
                 <a:solidFill>
                   <a:schemeClr val="tx1"/>
                 </a:solidFill>
@@ -647,7 +645,7 @@
               <a:t>risks of making messes</a:t>
             </a:r>
             <a:r>
-              <a:rPr lang="en-US" sz="1200" kern="1200" dirty="0" smtClean="0">
+              <a:rPr lang="en-US" sz="1200" kern="1200" dirty="0">
                 <a:solidFill>
                   <a:schemeClr val="tx1"/>
                 </a:solidFill>
@@ -658,7 +656,7 @@
               </a:rPr>
               <a:t>.</a:t>
             </a:r>
-            <a:endParaRPr lang="en-US" sz="1200" b="1" kern="1200" dirty="0" smtClean="0">
+            <a:endParaRPr lang="en-US" sz="1200" b="1" kern="1200" dirty="0">
               <a:solidFill>
                 <a:schemeClr val="tx1"/>
               </a:solidFill>
@@ -673,7 +671,7 @@
               <a:buNone/>
             </a:pPr>
             <a:r>
-              <a:rPr lang="en-US" sz="1200" kern="1200" dirty="0" smtClean="0">
+              <a:rPr lang="en-US" sz="1200" kern="1200" dirty="0">
                 <a:solidFill>
                   <a:schemeClr val="tx1"/>
                 </a:solidFill>
@@ -685,7 +683,7 @@
               <a:t>-   </a:t>
             </a:r>
             <a:r>
-              <a:rPr lang="x-none" sz="1200" kern="1200" dirty="0" smtClean="0">
+              <a:rPr lang="x-none" sz="1200" kern="1200" dirty="0">
                 <a:solidFill>
                   <a:schemeClr val="tx1"/>
                 </a:solidFill>
@@ -697,7 +695,7 @@
               <a:t>You will not </a:t>
             </a:r>
             <a:r>
-              <a:rPr lang="en-US" sz="1200" kern="1200" dirty="0" smtClean="0">
+              <a:rPr lang="en-US" sz="1200" kern="1200" dirty="0">
                 <a:solidFill>
                   <a:schemeClr val="tx1"/>
                 </a:solidFill>
@@ -709,7 +707,7 @@
               <a:t>make the </a:t>
             </a:r>
             <a:r>
-              <a:rPr lang="en-US" sz="1200" b="1" kern="1200" dirty="0" smtClean="0">
+              <a:rPr lang="en-US" sz="1200" b="1" kern="1200" dirty="0">
                 <a:solidFill>
                   <a:schemeClr val="tx1"/>
                 </a:solidFill>
@@ -721,7 +719,7 @@
               <a:t>deadline</a:t>
             </a:r>
             <a:r>
-              <a:rPr lang="en-US" sz="1200" kern="1200" dirty="0" smtClean="0">
+              <a:rPr lang="en-US" sz="1200" kern="1200" dirty="0">
                 <a:solidFill>
                   <a:schemeClr val="tx1"/>
                 </a:solidFill>
@@ -733,7 +731,7 @@
               <a:t> by making the mess. </a:t>
             </a:r>
             <a:r>
-              <a:rPr lang="x-none" sz="1200" kern="1200" dirty="0" smtClean="0">
+              <a:rPr lang="x-none" sz="1200" kern="1200" dirty="0">
                 <a:solidFill>
                   <a:schemeClr val="tx1"/>
                 </a:solidFill>
@@ -745,7 +743,7 @@
               <a:t>Indeed, the mess will slow you down instantly, and </a:t>
             </a:r>
             <a:r>
-              <a:rPr lang="en-US" sz="1200" kern="1200" dirty="0" smtClean="0">
+              <a:rPr lang="en-US" sz="1200" kern="1200" dirty="0">
                 <a:solidFill>
                   <a:schemeClr val="tx1"/>
                 </a:solidFill>
@@ -756,7 +754,7 @@
               </a:rPr>
               <a:t>will force you to miss the deadline.</a:t>
             </a:r>
-            <a:endParaRPr lang="x-none" sz="1200" kern="1200" dirty="0" smtClean="0">
+            <a:endParaRPr lang="x-none" sz="1200" kern="1200" dirty="0">
               <a:solidFill>
                 <a:schemeClr val="tx1"/>
               </a:solidFill>
@@ -798,101 +796,6 @@
     <p:extLst>
       <p:ext uri="{BB962C8B-B14F-4D97-AF65-F5344CB8AC3E}">
         <p14:creationId xmlns:p14="http://schemas.microsoft.com/office/powerpoint/2010/main" val="563834883"/>
-      </p:ext>
-    </p:extLst>
-  </p:cSld>
-  <p:clrMapOvr>
-    <a:masterClrMapping/>
-  </p:clrMapOvr>
-</p:notes>
-</file>
-
-<file path=ppt/notesSlides/notesSlide10.xml><?xml version="1.0" encoding="utf-8"?>
-<p:notes xmlns:a="http://schemas.openxmlformats.org/drawingml/2006/main" xmlns:r="http://schemas.openxmlformats.org/officeDocument/2006/relationships" xmlns:p="http://schemas.openxmlformats.org/presentationml/2006/main">
-  <p:cSld>
-    <p:spTree>
-      <p:nvGrpSpPr>
-        <p:cNvPr id="1" name=""/>
-        <p:cNvGrpSpPr/>
-        <p:nvPr/>
-      </p:nvGrpSpPr>
-      <p:grpSpPr>
-        <a:xfrm>
-          <a:off x="0" y="0"/>
-          <a:ext cx="0" cy="0"/>
-          <a:chOff x="0" y="0"/>
-          <a:chExt cx="0" cy="0"/>
-        </a:xfrm>
-      </p:grpSpPr>
-      <p:sp>
-        <p:nvSpPr>
-          <p:cNvPr id="2" name="Slide Image Placeholder 1"/>
-          <p:cNvSpPr>
-            <a:spLocks noGrp="1" noRot="1" noChangeAspect="1"/>
-          </p:cNvSpPr>
-          <p:nvPr>
-            <p:ph type="sldImg"/>
-          </p:nvPr>
-        </p:nvSpPr>
-        <p:spPr/>
-      </p:sp>
-      <p:sp>
-        <p:nvSpPr>
-          <p:cNvPr id="3" name="Notes Placeholder 2"/>
-          <p:cNvSpPr>
-            <a:spLocks noGrp="1"/>
-          </p:cNvSpPr>
-          <p:nvPr>
-            <p:ph type="body" idx="1"/>
-          </p:nvPr>
-        </p:nvSpPr>
-        <p:spPr/>
-        <p:txBody>
-          <a:bodyPr/>
-          <a:lstStyle/>
-          <a:p>
-            <a:pPr marL="0" indent="0" rtl="0" fontAlgn="ctr">
-              <a:buNone/>
-            </a:pPr>
-            <a:endParaRPr lang="x-none" sz="1200" kern="1200" dirty="0" smtClean="0">
-              <a:solidFill>
-                <a:schemeClr val="tx1"/>
-              </a:solidFill>
-              <a:effectLst/>
-              <a:latin typeface="+mn-lt"/>
-              <a:ea typeface="+mn-ea"/>
-              <a:cs typeface="+mn-cs"/>
-            </a:endParaRPr>
-          </a:p>
-        </p:txBody>
-      </p:sp>
-      <p:sp>
-        <p:nvSpPr>
-          <p:cNvPr id="4" name="Slide Number Placeholder 3"/>
-          <p:cNvSpPr>
-            <a:spLocks noGrp="1"/>
-          </p:cNvSpPr>
-          <p:nvPr>
-            <p:ph type="sldNum" sz="quarter" idx="10"/>
-          </p:nvPr>
-        </p:nvSpPr>
-        <p:spPr/>
-        <p:txBody>
-          <a:bodyPr/>
-          <a:lstStyle/>
-          <a:p>
-            <a:fld id="{38627BB8-F6A4-4A78-9DDC-C4121304CC62}" type="slidenum">
-              <a:rPr lang="en-US" smtClean="0"/>
-              <a:t>11</a:t>
-            </a:fld>
-            <a:endParaRPr lang="en-US"/>
-          </a:p>
-        </p:txBody>
-      </p:sp>
-    </p:spTree>
-    <p:extLst>
-      <p:ext uri="{BB962C8B-B14F-4D97-AF65-F5344CB8AC3E}">
-        <p14:creationId xmlns:p14="http://schemas.microsoft.com/office/powerpoint/2010/main" val="1520329463"/>
       </p:ext>
     </p:extLst>
   </p:cSld>
@@ -947,7 +850,7 @@
           <a:lstStyle/>
           <a:p>
             <a:r>
-              <a:rPr lang="en-US" sz="1200" kern="1200" dirty="0" smtClean="0">
+              <a:rPr lang="en-US" sz="1200" kern="1200" dirty="0">
                 <a:solidFill>
                   <a:schemeClr val="tx1"/>
                 </a:solidFill>
@@ -961,7 +864,7 @@
           </a:p>
           <a:p>
             <a:r>
-              <a:rPr lang="en-US" sz="1200" kern="1200" dirty="0" smtClean="0">
+              <a:rPr lang="en-US" sz="1200" kern="1200" dirty="0">
                 <a:solidFill>
                   <a:schemeClr val="tx1"/>
                 </a:solidFill>
@@ -973,7 +876,7 @@
               <a:t>meanwhile </a:t>
             </a:r>
             <a:r>
-              <a:rPr lang="en-US" sz="1200" i="1" kern="1200" dirty="0" smtClean="0">
+              <a:rPr lang="en-US" sz="1200" i="1" kern="1200" dirty="0">
                 <a:solidFill>
                   <a:schemeClr val="tx1"/>
                 </a:solidFill>
@@ -985,7 +888,7 @@
               <a:t>keeping up</a:t>
             </a:r>
             <a:r>
-              <a:rPr lang="en-US" sz="1200" kern="1200" dirty="0" smtClean="0">
+              <a:rPr lang="en-US" sz="1200" kern="1200" dirty="0">
                 <a:solidFill>
                   <a:schemeClr val="tx1"/>
                 </a:solidFill>
@@ -997,7 +900,7 @@
               <a:t> with changes that are </a:t>
             </a:r>
             <a:r>
-              <a:rPr lang="en-US" sz="1200" i="1" kern="1200" dirty="0" smtClean="0">
+              <a:rPr lang="en-US" sz="1200" i="1" kern="1200" dirty="0">
                 <a:solidFill>
                   <a:schemeClr val="tx1"/>
                 </a:solidFill>
@@ -1011,7 +914,7 @@
           </a:p>
           <a:p>
             <a:r>
-              <a:rPr lang="en-US" sz="1200" kern="1200" dirty="0" smtClean="0">
+              <a:rPr lang="en-US" sz="1200" kern="1200" dirty="0">
                 <a:solidFill>
                   <a:schemeClr val="tx1"/>
                 </a:solidFill>
@@ -1108,7 +1011,7 @@
           <a:p>
             <a:pPr rtl="0" fontAlgn="ctr"/>
             <a:r>
-              <a:rPr lang="en-US" sz="1200" kern="1200" dirty="0" smtClean="0">
+              <a:rPr lang="en-US" sz="1200" kern="1200" dirty="0">
                 <a:solidFill>
                   <a:schemeClr val="tx1"/>
                 </a:solidFill>
@@ -1120,7 +1023,7 @@
               <a:t>When others change bad code, they tend to</a:t>
             </a:r>
             <a:r>
-              <a:rPr lang="en-US" sz="1200" kern="1200" baseline="0" dirty="0" smtClean="0">
+              <a:rPr lang="en-US" sz="1200" kern="1200" baseline="0" dirty="0">
                 <a:solidFill>
                   <a:schemeClr val="tx1"/>
                 </a:solidFill>
@@ -1132,7 +1035,7 @@
               <a:t> </a:t>
             </a:r>
             <a:r>
-              <a:rPr lang="en-US" sz="1200" kern="1200" dirty="0" smtClean="0">
+              <a:rPr lang="en-US" sz="1200" kern="1200" dirty="0">
                 <a:solidFill>
                   <a:schemeClr val="tx1"/>
                 </a:solidFill>
@@ -1148,7 +1051,7 @@
             <a:pPr marL="0" indent="0" rtl="0" fontAlgn="ctr">
               <a:buNone/>
             </a:pPr>
-            <a:endParaRPr lang="x-none" sz="1200" kern="1200" dirty="0" smtClean="0">
+            <a:endParaRPr lang="x-none" sz="1200" kern="1200" dirty="0">
               <a:solidFill>
                 <a:schemeClr val="tx1"/>
               </a:solidFill>
@@ -1244,7 +1147,7 @@
               <a:buNone/>
             </a:pPr>
             <a:r>
-              <a:rPr lang="en-US" sz="1200" kern="1200" dirty="0" smtClean="0">
+              <a:rPr lang="en-US" sz="1200" kern="1200" dirty="0">
                 <a:solidFill>
                   <a:schemeClr val="tx1"/>
                 </a:solidFill>
@@ -1255,7 +1158,7 @@
               </a:rPr>
               <a:t>A building with broken windows looks like nobody cares about it. So other people stop caring.</a:t>
             </a:r>
-            <a:endParaRPr lang="x-none" sz="1200" kern="1200" dirty="0" smtClean="0">
+            <a:endParaRPr lang="x-none" sz="1200" kern="1200" dirty="0">
               <a:solidFill>
                 <a:schemeClr val="tx1"/>
               </a:solidFill>
@@ -1353,7 +1256,7 @@
             <a:pPr marL="0" indent="0" rtl="0" fontAlgn="ctr">
               <a:buNone/>
             </a:pPr>
-            <a:endParaRPr lang="x-none" sz="1200" kern="1200" dirty="0" smtClean="0">
+            <a:endParaRPr lang="x-none" sz="1200" kern="1200" dirty="0">
               <a:solidFill>
                 <a:schemeClr val="tx1"/>
               </a:solidFill>
@@ -1451,7 +1354,7 @@
             <a:pPr marL="0" indent="0" rtl="0" fontAlgn="ctr">
               <a:buNone/>
             </a:pPr>
-            <a:endParaRPr lang="x-none" sz="1200" kern="1200" dirty="0" smtClean="0">
+            <a:endParaRPr lang="x-none" sz="1200" kern="1200" dirty="0">
               <a:solidFill>
                 <a:schemeClr val="tx1"/>
               </a:solidFill>
@@ -1549,7 +1452,7 @@
             <a:pPr marL="0" indent="0" rtl="0" fontAlgn="ctr">
               <a:buNone/>
             </a:pPr>
-            <a:endParaRPr lang="x-none" sz="1200" kern="1200" dirty="0" smtClean="0">
+            <a:endParaRPr lang="x-none" sz="1200" kern="1200" dirty="0">
               <a:solidFill>
                 <a:schemeClr val="tx1"/>
               </a:solidFill>
@@ -1561,7 +1464,7 @@
           </a:p>
           <a:p>
             <a:r>
-              <a:rPr lang="en-US" sz="1200" kern="1200" dirty="0" smtClean="0">
+              <a:rPr lang="en-US" sz="1200" kern="1200" dirty="0">
                 <a:solidFill>
                   <a:schemeClr val="tx1"/>
                 </a:solidFill>
@@ -1659,7 +1562,7 @@
             <a:pPr marL="0" indent="0" rtl="0" fontAlgn="ctr">
               <a:buNone/>
             </a:pPr>
-            <a:endParaRPr lang="x-none" sz="1200" kern="1200" dirty="0" smtClean="0">
+            <a:endParaRPr lang="x-none" sz="1200" kern="1200" dirty="0">
               <a:solidFill>
                 <a:schemeClr val="tx1"/>
               </a:solidFill>
@@ -1757,7 +1660,73 @@
             <a:pPr marL="0" indent="0" rtl="0" fontAlgn="ctr">
               <a:buNone/>
             </a:pPr>
-            <a:endParaRPr lang="x-none" sz="1200" kern="1200" dirty="0" smtClean="0">
+            <a:r>
+              <a:rPr lang="en-US" sz="1200" kern="1200" dirty="0">
+                <a:solidFill>
+                  <a:schemeClr val="tx1"/>
+                </a:solidFill>
+                <a:effectLst/>
+                <a:latin typeface="+mn-lt"/>
+                <a:ea typeface="+mn-ea"/>
+                <a:cs typeface="+mn-cs"/>
+              </a:rPr>
+              <a:t>Use learning</a:t>
+            </a:r>
+            <a:r>
+              <a:rPr lang="en-US" sz="1200" kern="1200" baseline="0" dirty="0">
+                <a:solidFill>
+                  <a:schemeClr val="tx1"/>
+                </a:solidFill>
+                <a:effectLst/>
+                <a:latin typeface="+mn-lt"/>
+                <a:ea typeface="+mn-ea"/>
+                <a:cs typeface="+mn-cs"/>
+              </a:rPr>
+              <a:t> curve theory to:</a:t>
+            </a:r>
+          </a:p>
+          <a:p>
+            <a:pPr marL="171450" indent="-171450" rtl="0" fontAlgn="ctr">
+              <a:buFontTx/>
+              <a:buChar char="-"/>
+            </a:pPr>
+            <a:r>
+              <a:rPr lang="en-US" sz="1200" kern="1200" baseline="0" dirty="0">
+                <a:solidFill>
+                  <a:schemeClr val="tx1"/>
+                </a:solidFill>
+                <a:effectLst/>
+                <a:latin typeface="+mn-lt"/>
+                <a:ea typeface="+mn-ea"/>
+                <a:cs typeface="+mn-cs"/>
+              </a:rPr>
+              <a:t>Choose between tools to work with.</a:t>
+            </a:r>
+          </a:p>
+          <a:p>
+            <a:pPr marL="171450" indent="-171450" rtl="0" fontAlgn="ctr">
+              <a:buFontTx/>
+              <a:buChar char="-"/>
+            </a:pPr>
+            <a:r>
+              <a:rPr lang="en-US" sz="1200" kern="1200" baseline="0" dirty="0">
+                <a:solidFill>
+                  <a:schemeClr val="tx1"/>
+                </a:solidFill>
+                <a:effectLst/>
+                <a:latin typeface="+mn-lt"/>
+                <a:ea typeface="+mn-ea"/>
+                <a:cs typeface="+mn-cs"/>
+              </a:rPr>
+              <a:t>Estimate your work on R&amp;D tasks</a:t>
+            </a:r>
+          </a:p>
+          <a:p>
+            <a:pPr marL="171450" indent="-171450" rtl="0" fontAlgn="ctr">
+              <a:buFontTx/>
+              <a:buChar char="-"/>
+            </a:pPr>
+            <a:endParaRPr lang="en-US" sz="1200" kern="1200" baseline="0" dirty="0">
               <a:solidFill>
                 <a:schemeClr val="tx1"/>
               </a:solidFill>
@@ -1768,24 +1737,18 @@
             </a:endParaRPr>
           </a:p>
           <a:p>
-            <a:r>
-              <a:rPr lang="en-US" dirty="0" smtClean="0"/>
-              <a:t>Show them C# coding style guides at Microsoft docs</a:t>
-            </a:r>
-          </a:p>
-          <a:p>
-            <a:r>
-              <a:rPr lang="en-US" dirty="0" smtClean="0"/>
-              <a:t>https://git.ir</a:t>
-            </a:r>
-            <a:r>
-              <a:rPr lang="en-US" baseline="0" dirty="0" smtClean="0"/>
-              <a:t> =&gt; clean code videos</a:t>
-            </a:r>
-            <a:endParaRPr lang="en-US" dirty="0" smtClean="0"/>
-          </a:p>
-          <a:p>
-            <a:endParaRPr lang="en-US" dirty="0" smtClean="0"/>
+            <a:pPr marL="0" indent="0" rtl="0" fontAlgn="ctr">
+              <a:buNone/>
+            </a:pPr>
+            <a:endParaRPr lang="x-none" sz="1200" kern="1200" dirty="0">
+              <a:solidFill>
+                <a:schemeClr val="tx1"/>
+              </a:solidFill>
+              <a:effectLst/>
+              <a:latin typeface="+mn-lt"/>
+              <a:ea typeface="+mn-ea"/>
+              <a:cs typeface="+mn-cs"/>
+            </a:endParaRPr>
           </a:p>
         </p:txBody>
       </p:sp>
@@ -1815,7 +1778,7 @@
     </p:spTree>
     <p:extLst>
       <p:ext uri="{BB962C8B-B14F-4D97-AF65-F5344CB8AC3E}">
-        <p14:creationId xmlns:p14="http://schemas.microsoft.com/office/powerpoint/2010/main" val="2282082622"/>
+        <p14:creationId xmlns:p14="http://schemas.microsoft.com/office/powerpoint/2010/main" val="28760946"/>
       </p:ext>
     </p:extLst>
   </p:cSld>
@@ -1964,7 +1927,7 @@
           <a:p>
             <a:fld id="{1D8BD707-D9CF-40AE-B4C6-C98DA3205C09}" type="datetimeFigureOut">
               <a:rPr lang="en-US"/>
-              <a:t>12/23/2020</a:t>
+              <a:t>4/10/2021</a:t>
             </a:fld>
             <a:endParaRPr lang="en-US"/>
           </a:p>
@@ -2139,7 +2102,7 @@
           <a:p>
             <a:fld id="{1D8BD707-D9CF-40AE-B4C6-C98DA3205C09}" type="datetimeFigureOut">
               <a:rPr lang="en-US"/>
-              <a:t>12/23/2020</a:t>
+              <a:t>4/10/2021</a:t>
             </a:fld>
             <a:endParaRPr lang="en-US"/>
           </a:p>
@@ -2353,7 +2316,7 @@
           <a:p>
             <a:fld id="{1D8BD707-D9CF-40AE-B4C6-C98DA3205C09}" type="datetimeFigureOut">
               <a:rPr lang="en-US"/>
-              <a:t>12/23/2020</a:t>
+              <a:t>4/10/2021</a:t>
             </a:fld>
             <a:endParaRPr lang="en-US"/>
           </a:p>
@@ -2501,7 +2464,7 @@
           <a:p>
             <a:fld id="{1D8BD707-D9CF-40AE-B4C6-C98DA3205C09}" type="datetimeFigureOut">
               <a:rPr lang="en-US"/>
-              <a:t>12/23/2020</a:t>
+              <a:t>4/10/2021</a:t>
             </a:fld>
             <a:endParaRPr lang="en-US"/>
           </a:p>
@@ -2620,7 +2583,7 @@
           <a:p>
             <a:fld id="{1D8BD707-D9CF-40AE-B4C6-C98DA3205C09}" type="datetimeFigureOut">
               <a:rPr lang="en-US"/>
-              <a:t>12/23/2020</a:t>
+              <a:t>4/10/2021</a:t>
             </a:fld>
             <a:endParaRPr lang="en-US"/>
           </a:p>
@@ -2922,7 +2885,7 @@
           <a:p>
             <a:fld id="{1D8BD707-D9CF-40AE-B4C6-C98DA3205C09}" type="datetimeFigureOut">
               <a:rPr lang="en-US"/>
-              <a:t>12/23/2020</a:t>
+              <a:t>4/10/2021</a:t>
             </a:fld>
             <a:endParaRPr lang="en-US"/>
           </a:p>
@@ -3201,21 +3164,17 @@
               </a:lnSpc>
             </a:pPr>
             <a:r>
-              <a:rPr lang="en-US" sz="6000" dirty="0" smtClean="0"/>
+              <a:rPr lang="en-US" sz="6000" dirty="0"/>
               <a:t>Chapter 1</a:t>
             </a:r>
             <a:br>
-              <a:rPr lang="en-US" sz="6000" dirty="0" smtClean="0"/>
+              <a:rPr lang="en-US" sz="6000" dirty="0"/>
             </a:br>
-            <a:r>
-              <a:rPr lang="en-US" spc="-10" dirty="0" smtClean="0"/>
-              <a:t/>
-            </a:r>
             <a:br>
-              <a:rPr lang="en-US" spc="-10" dirty="0" smtClean="0"/>
+              <a:rPr lang="en-US" spc="-10" dirty="0"/>
             </a:br>
             <a:r>
-              <a:rPr lang="en-US" spc="-10" dirty="0" smtClean="0"/>
+              <a:rPr lang="en-US" spc="-10" dirty="0"/>
               <a:t>Clean Code</a:t>
             </a:r>
             <a:endParaRPr spc="-5" dirty="0"/>
@@ -3227,13 +3186,6 @@
   <p:clrMapOvr>
     <a:masterClrMapping/>
   </p:clrMapOvr>
-  <p:timing>
-    <p:tnLst>
-      <p:par>
-        <p:cTn id="1" dur="indefinite" restart="never" nodeType="tmRoot"/>
-      </p:par>
-    </p:tnLst>
-  </p:timing>
 </p:sld>
 </file>
 
@@ -3266,8 +3218,8 @@
         </p:nvSpPr>
         <p:spPr>
           <a:xfrm>
-            <a:off x="-990600" y="1143476"/>
-            <a:ext cx="12417805" cy="615553"/>
+            <a:off x="-1066800" y="1143000"/>
+            <a:ext cx="13027405" cy="615553"/>
           </a:xfrm>
           <a:prstGeom prst="rect">
             <a:avLst/>
@@ -3285,7 +3237,7 @@
               </a:lnSpc>
             </a:pPr>
             <a:r>
-              <a:rPr lang="en-US" spc="-5" dirty="0" smtClean="0">
+              <a:rPr lang="en-US" spc="-5" dirty="0">
                 <a:solidFill>
                   <a:srgbClr val="00B0F0"/>
                 </a:solidFill>
@@ -3293,8 +3245,8 @@
               <a:t>Vocabulary</a:t>
             </a:r>
             <a:r>
-              <a:rPr lang="en-US" spc="-5" dirty="0" smtClean="0"/>
-              <a:t>: Coding style</a:t>
+              <a:rPr lang="en-US" spc="-5" dirty="0"/>
+              <a:t>: Learning curve</a:t>
             </a:r>
             <a:endParaRPr spc="-5" dirty="0">
               <a:latin typeface="Century Gothic"/>
@@ -3311,8 +3263,8 @@
         </p:nvSpPr>
         <p:spPr>
           <a:xfrm>
-            <a:off x="892986" y="2367695"/>
-            <a:ext cx="10689413" cy="2954655"/>
+            <a:off x="892986" y="2133600"/>
+            <a:ext cx="10765614" cy="1477328"/>
           </a:xfrm>
           <a:prstGeom prst="rect">
             <a:avLst/>
@@ -3324,232 +3276,217 @@
           </a:bodyPr>
           <a:lstStyle/>
           <a:p>
-            <a:pPr marL="241300" indent="-228600">
+            <a:pPr marL="12700">
               <a:lnSpc>
                 <a:spcPct val="100000"/>
               </a:lnSpc>
-              <a:buFont typeface="Arial"/>
-              <a:buChar char="•"/>
               <a:tabLst>
                 <a:tab pos="241300" algn="l"/>
               </a:tabLst>
             </a:pPr>
             <a:r>
-              <a:rPr lang="en-US" sz="3200" dirty="0" smtClean="0">
+              <a:rPr lang="en-US" sz="3200" dirty="0">
                 <a:solidFill>
                   <a:srgbClr val="FFFFFF"/>
                 </a:solidFill>
                 <a:latin typeface="Century Gothic"/>
                 <a:cs typeface="Century Gothic"/>
               </a:rPr>
-              <a:t>Set </a:t>
+              <a:t>Relationship between </a:t>
             </a:r>
             <a:r>
               <a:rPr lang="en-US" sz="3200" dirty="0">
                 <a:solidFill>
-                  <a:srgbClr val="FFFFFF"/>
+                  <a:srgbClr val="FFFF00"/>
                 </a:solidFill>
                 <a:latin typeface="Century Gothic"/>
                 <a:cs typeface="Century Gothic"/>
               </a:rPr>
-              <a:t>of rules or </a:t>
-            </a:r>
-            <a:r>
-              <a:rPr lang="en-US" sz="3200" dirty="0" smtClean="0">
+              <a:t>Proficiency</a:t>
+            </a:r>
+            <a:r>
+              <a:rPr lang="en-US" sz="3200" dirty="0">
                 <a:solidFill>
                   <a:srgbClr val="FFFFFF"/>
                 </a:solidFill>
                 <a:latin typeface="Century Gothic"/>
                 <a:cs typeface="Century Gothic"/>
               </a:rPr>
-              <a:t>guidelines to write and read code</a:t>
-            </a:r>
-          </a:p>
-          <a:p>
-            <a:pPr marL="241300" indent="-228600">
-              <a:lnSpc>
-                <a:spcPct val="100000"/>
-              </a:lnSpc>
-              <a:buFont typeface="Arial"/>
-              <a:buChar char="•"/>
-              <a:tabLst>
-                <a:tab pos="241300" algn="l"/>
-              </a:tabLst>
-            </a:pPr>
-            <a:endParaRPr lang="en-US" sz="3200" dirty="0" smtClean="0">
+              <a:t> and </a:t>
+            </a:r>
+            <a:r>
+              <a:rPr lang="en-US" sz="3200" dirty="0">
+                <a:solidFill>
+                  <a:srgbClr val="FFFF00"/>
+                </a:solidFill>
+                <a:latin typeface="Century Gothic"/>
+                <a:cs typeface="Century Gothic"/>
+              </a:rPr>
+              <a:t>Amount of time </a:t>
+            </a:r>
+            <a:r>
+              <a:rPr lang="en-US" sz="3200" dirty="0">
+                <a:solidFill>
+                  <a:srgbClr val="FFFFFF"/>
+                </a:solidFill>
+                <a:latin typeface="Century Gothic"/>
+                <a:cs typeface="Century Gothic"/>
+              </a:rPr>
+              <a:t>you spend to learn something</a:t>
+            </a:r>
+            <a:br>
+              <a:rPr lang="en-US" sz="3200" dirty="0">
+                <a:solidFill>
+                  <a:srgbClr val="FFFFFF"/>
+                </a:solidFill>
+                <a:latin typeface="Century Gothic"/>
+                <a:cs typeface="Century Gothic"/>
+              </a:rPr>
+            </a:br>
+            <a:r>
+              <a:rPr lang="en-US" sz="3200" dirty="0">
+                <a:solidFill>
+                  <a:srgbClr val="FFFFFF"/>
+                </a:solidFill>
+                <a:latin typeface="Century Gothic"/>
+                <a:cs typeface="Century Gothic"/>
+              </a:rPr>
+              <a:t>To do a task as Done.</a:t>
+            </a:r>
+            <a:endParaRPr lang="en-US" sz="3200" dirty="0">
               <a:solidFill>
-                <a:srgbClr val="FFFFFF"/>
+                <a:schemeClr val="bg1"/>
               </a:solidFill>
               <a:latin typeface="Century Gothic"/>
               <a:cs typeface="Century Gothic"/>
             </a:endParaRPr>
           </a:p>
-          <a:p>
-            <a:pPr marL="241300" indent="-228600">
-              <a:lnSpc>
-                <a:spcPct val="100000"/>
-              </a:lnSpc>
-              <a:buFont typeface="Arial"/>
-              <a:buChar char="•"/>
-              <a:tabLst>
-                <a:tab pos="241300" algn="l"/>
-              </a:tabLst>
-            </a:pPr>
-            <a:r>
-              <a:rPr lang="en-US" sz="3200" dirty="0" smtClean="0">
-                <a:solidFill>
-                  <a:srgbClr val="FFFFFF"/>
-                </a:solidFill>
-                <a:latin typeface="Century Gothic"/>
-                <a:cs typeface="Century Gothic"/>
-              </a:rPr>
-              <a:t>Help teams to understand each other’s code</a:t>
-            </a:r>
-          </a:p>
-          <a:p>
-            <a:pPr marL="241300" indent="-228600">
-              <a:lnSpc>
-                <a:spcPct val="100000"/>
-              </a:lnSpc>
-              <a:buFont typeface="Arial"/>
-              <a:buChar char="•"/>
-              <a:tabLst>
-                <a:tab pos="241300" algn="l"/>
-              </a:tabLst>
-            </a:pPr>
-            <a:endParaRPr lang="en-US" sz="3200" dirty="0">
-              <a:solidFill>
-                <a:srgbClr val="FFFFFF"/>
-              </a:solidFill>
-              <a:latin typeface="Century Gothic"/>
-              <a:cs typeface="Century Gothic"/>
-            </a:endParaRPr>
-          </a:p>
-          <a:p>
-            <a:pPr marL="241300" indent="-228600">
-              <a:lnSpc>
-                <a:spcPct val="100000"/>
-              </a:lnSpc>
-              <a:buFont typeface="Arial"/>
-              <a:buChar char="•"/>
-              <a:tabLst>
-                <a:tab pos="241300" algn="l"/>
-              </a:tabLst>
-            </a:pPr>
-            <a:r>
-              <a:rPr lang="en-US" sz="3200" dirty="0" smtClean="0">
-                <a:solidFill>
-                  <a:srgbClr val="FFFFFF"/>
-                </a:solidFill>
-                <a:latin typeface="Century Gothic"/>
-                <a:cs typeface="Century Gothic"/>
-              </a:rPr>
-              <a:t>Reduce conflicts on source control and enhance code review</a:t>
-            </a:r>
-            <a:endParaRPr sz="3200" dirty="0">
-              <a:latin typeface="Century Gothic"/>
-              <a:cs typeface="Century Gothic"/>
-            </a:endParaRPr>
-          </a:p>
-        </p:txBody>
-      </p:sp>
-      <p:sp>
-        <p:nvSpPr>
-          <p:cNvPr id="4" name="Rectangle 3"/>
-          <p:cNvSpPr/>
+        </p:txBody>
+      </p:sp>
+      <p:pic>
+        <p:nvPicPr>
+          <p:cNvPr id="1026" name="Picture 2" descr="https://en.wikipedia.org/api/rest_v1/page/graph/png/Learning_curve/0/8ecbe54983fb93cd5cacd2eaf19e9f5e1bb6f245.png"/>
+          <p:cNvPicPr>
+            <a:picLocks noChangeAspect="1" noChangeArrowheads="1"/>
+          </p:cNvPicPr>
           <p:nvPr/>
-        </p:nvSpPr>
-        <p:spPr>
+        </p:nvPicPr>
+        <p:blipFill>
+          <a:blip r:embed="rId3">
+            <a:extLst>
+              <a:ext uri="{28A0092B-C50C-407E-A947-70E740481C1C}">
+                <a14:useLocalDpi xmlns:a14="http://schemas.microsoft.com/office/drawing/2010/main" val="0"/>
+              </a:ext>
+            </a:extLst>
+          </a:blip>
+          <a:srcRect/>
+          <a:stretch>
+            <a:fillRect/>
+          </a:stretch>
+        </p:blipFill>
+        <p:spPr bwMode="auto">
           <a:xfrm>
-            <a:off x="9677400" y="6307235"/>
-            <a:ext cx="2209800" cy="369332"/>
+            <a:off x="1752600" y="4034444"/>
+            <a:ext cx="3453938" cy="2517040"/>
           </a:xfrm>
-          <a:prstGeom prst="rect">
-            <a:avLst/>
+          <a:prstGeom prst="roundRect">
+            <a:avLst>
+              <a:gd name="adj" fmla="val 4167"/>
+            </a:avLst>
           </a:prstGeom>
+          <a:solidFill>
+            <a:srgbClr val="FFFFFF"/>
+          </a:solidFill>
+          <a:ln w="76200" cap="sq">
+            <a:solidFill>
+              <a:srgbClr val="EAEAEA"/>
+            </a:solidFill>
+            <a:miter lim="800000"/>
+          </a:ln>
+          <a:effectLst>
+            <a:reflection blurRad="12700" stA="33000" endPos="28000" dist="5000" dir="5400000" sy="-100000" algn="bl" rotWithShape="0"/>
+          </a:effectLst>
+          <a:scene3d>
+            <a:camera prst="orthographicFront"/>
+            <a:lightRig rig="threePt" dir="t">
+              <a:rot lat="0" lon="0" rev="2700000"/>
+            </a:lightRig>
+          </a:scene3d>
+          <a:sp3d contourW="6350">
+            <a:bevelT h="38100"/>
+            <a:contourClr>
+              <a:srgbClr val="C0C0C0"/>
+            </a:contourClr>
+          </a:sp3d>
         </p:spPr>
-        <p:txBody>
-          <a:bodyPr wrap="square">
-            <a:spAutoFit/>
-          </a:bodyPr>
-          <a:lstStyle/>
-          <a:p>
-            <a:pPr lvl="0">
-              <a:defRPr/>
-            </a:pPr>
-            <a:r>
-              <a:rPr lang="en-US" dirty="0" smtClean="0">
-                <a:solidFill>
-                  <a:srgbClr val="0070C0"/>
-                </a:solidFill>
-                <a:hlinkClick r:id="rId3"/>
-              </a:rPr>
-              <a:t>C# coding styles</a:t>
-            </a:r>
-            <a:endParaRPr lang="en-US" dirty="0">
-              <a:solidFill>
-                <a:srgbClr val="0070C0"/>
-              </a:solidFill>
-            </a:endParaRPr>
-          </a:p>
-        </p:txBody>
-      </p:sp>
-      <p:sp>
-        <p:nvSpPr>
-          <p:cNvPr id="5" name="TextBox 4"/>
-          <p:cNvSpPr txBox="1"/>
+      </p:pic>
+      <p:pic>
+        <p:nvPicPr>
+          <p:cNvPr id="1028" name="Picture 4" descr="https://en.wikipedia.org/api/rest_v1/page/graph/png/Learning_curve/0/d5319f58b5392f830a0a3406a14a65d110da8784.png"/>
+          <p:cNvPicPr>
+            <a:picLocks noChangeAspect="1" noChangeArrowheads="1"/>
+          </p:cNvPicPr>
           <p:nvPr/>
-        </p:nvSpPr>
-        <p:spPr>
+        </p:nvPicPr>
+        <p:blipFill>
+          <a:blip r:embed="rId4">
+            <a:extLst>
+              <a:ext uri="{28A0092B-C50C-407E-A947-70E740481C1C}">
+                <a14:useLocalDpi xmlns:a14="http://schemas.microsoft.com/office/drawing/2010/main" val="0"/>
+              </a:ext>
+            </a:extLst>
+          </a:blip>
+          <a:srcRect/>
+          <a:stretch>
+            <a:fillRect/>
+          </a:stretch>
+        </p:blipFill>
+        <p:spPr bwMode="auto">
           <a:xfrm>
-            <a:off x="892986" y="6307235"/>
-            <a:ext cx="850297" cy="369332"/>
+            <a:off x="7086601" y="4034444"/>
+            <a:ext cx="3593774" cy="2517040"/>
           </a:xfrm>
-          <a:prstGeom prst="rect">
-            <a:avLst/>
+          <a:prstGeom prst="roundRect">
+            <a:avLst>
+              <a:gd name="adj" fmla="val 4167"/>
+            </a:avLst>
           </a:prstGeom>
-          <a:noFill/>
+          <a:solidFill>
+            <a:srgbClr val="FFFFFF"/>
+          </a:solidFill>
+          <a:ln w="76200" cap="sq">
+            <a:solidFill>
+              <a:srgbClr val="EAEAEA"/>
+            </a:solidFill>
+            <a:miter lim="800000"/>
+          </a:ln>
+          <a:effectLst>
+            <a:reflection blurRad="12700" stA="33000" endPos="28000" dist="5000" dir="5400000" sy="-100000" algn="bl" rotWithShape="0"/>
+          </a:effectLst>
+          <a:scene3d>
+            <a:camera prst="orthographicFront"/>
+            <a:lightRig rig="threePt" dir="t">
+              <a:rot lat="0" lon="0" rev="2700000"/>
+            </a:lightRig>
+          </a:scene3d>
+          <a:sp3d contourW="6350">
+            <a:bevelT h="38100"/>
+            <a:contourClr>
+              <a:srgbClr val="C0C0C0"/>
+            </a:contourClr>
+          </a:sp3d>
         </p:spPr>
-        <p:txBody>
-          <a:bodyPr wrap="none" rtlCol="0">
-            <a:spAutoFit/>
-          </a:bodyPr>
-          <a:lstStyle/>
-          <a:p>
-            <a:r>
-              <a:rPr lang="en-US" dirty="0" smtClean="0">
-                <a:solidFill>
-                  <a:schemeClr val="bg1"/>
-                </a:solidFill>
-                <a:hlinkClick r:id="rId4"/>
-              </a:rPr>
-              <a:t>Quizlet</a:t>
-            </a:r>
-            <a:endParaRPr lang="en-US" dirty="0">
-              <a:solidFill>
-                <a:schemeClr val="bg1"/>
-              </a:solidFill>
-            </a:endParaRPr>
-          </a:p>
-        </p:txBody>
-      </p:sp>
+      </p:pic>
     </p:spTree>
     <p:extLst>
       <p:ext uri="{BB962C8B-B14F-4D97-AF65-F5344CB8AC3E}">
-        <p14:creationId xmlns:p14="http://schemas.microsoft.com/office/powerpoint/2010/main" val="1645955136"/>
+        <p14:creationId xmlns:p14="http://schemas.microsoft.com/office/powerpoint/2010/main" val="208142798"/>
       </p:ext>
     </p:extLst>
   </p:cSld>
   <p:clrMapOvr>
     <a:masterClrMapping/>
   </p:clrMapOvr>
-  <p:timing>
-    <p:tnLst>
-      <p:par>
-        <p:cTn id="1" dur="indefinite" restart="never" nodeType="tmRoot"/>
-      </p:par>
-    </p:tnLst>
-  </p:timing>
 </p:sld>
 </file>
 
@@ -3582,320 +3519,6 @@
         </p:nvSpPr>
         <p:spPr>
           <a:xfrm>
-            <a:off x="-990600" y="1143476"/>
-            <a:ext cx="12417805" cy="615553"/>
-          </a:xfrm>
-          <a:prstGeom prst="rect">
-            <a:avLst/>
-          </a:prstGeom>
-        </p:spPr>
-        <p:txBody>
-          <a:bodyPr vert="horz" wrap="square" lIns="0" tIns="0" rIns="0" bIns="0" rtlCol="0">
-            <a:spAutoFit/>
-          </a:bodyPr>
-          <a:lstStyle/>
-          <a:p>
-            <a:pPr marL="6086475">
-              <a:lnSpc>
-                <a:spcPct val="100000"/>
-              </a:lnSpc>
-            </a:pPr>
-            <a:r>
-              <a:rPr lang="en-US" spc="-5" dirty="0" smtClean="0">
-                <a:solidFill>
-                  <a:srgbClr val="00B0F0"/>
-                </a:solidFill>
-              </a:rPr>
-              <a:t>Tool</a:t>
-            </a:r>
-            <a:r>
-              <a:rPr lang="en-US" spc="-5" dirty="0" smtClean="0"/>
-              <a:t>: Lint checker</a:t>
-            </a:r>
-            <a:endParaRPr spc="-5" dirty="0">
-              <a:latin typeface="Century Gothic"/>
-              <a:cs typeface="Century Gothic"/>
-            </a:endParaRPr>
-          </a:p>
-        </p:txBody>
-      </p:sp>
-      <p:sp>
-        <p:nvSpPr>
-          <p:cNvPr id="3" name="object 3"/>
-          <p:cNvSpPr txBox="1"/>
-          <p:nvPr/>
-        </p:nvSpPr>
-        <p:spPr>
-          <a:xfrm>
-            <a:off x="892986" y="2367695"/>
-            <a:ext cx="10156013" cy="3939540"/>
-          </a:xfrm>
-          <a:prstGeom prst="rect">
-            <a:avLst/>
-          </a:prstGeom>
-        </p:spPr>
-        <p:txBody>
-          <a:bodyPr vert="horz" wrap="square" lIns="0" tIns="0" rIns="0" bIns="0" rtlCol="0">
-            <a:spAutoFit/>
-          </a:bodyPr>
-          <a:lstStyle/>
-          <a:p>
-            <a:pPr marL="241300" indent="-228600">
-              <a:lnSpc>
-                <a:spcPct val="100000"/>
-              </a:lnSpc>
-              <a:buFont typeface="Arial"/>
-              <a:buChar char="•"/>
-              <a:tabLst>
-                <a:tab pos="241300" algn="l"/>
-              </a:tabLst>
-            </a:pPr>
-            <a:r>
-              <a:rPr lang="en-US" sz="3200" dirty="0" smtClean="0">
-                <a:solidFill>
-                  <a:srgbClr val="FFFF00"/>
-                </a:solidFill>
-                <a:latin typeface="Century Gothic"/>
-                <a:cs typeface="Century Gothic"/>
-              </a:rPr>
-              <a:t>Static </a:t>
-            </a:r>
-            <a:r>
-              <a:rPr lang="en-US" sz="3200" dirty="0">
-                <a:solidFill>
-                  <a:srgbClr val="FFFF00"/>
-                </a:solidFill>
-                <a:latin typeface="Century Gothic"/>
-                <a:cs typeface="Century Gothic"/>
-              </a:rPr>
-              <a:t>code analysis tool</a:t>
-            </a:r>
-            <a:endParaRPr lang="en-US" sz="3200" dirty="0" smtClean="0">
-              <a:solidFill>
-                <a:srgbClr val="FFFF00"/>
-              </a:solidFill>
-              <a:latin typeface="Century Gothic"/>
-              <a:cs typeface="Century Gothic"/>
-            </a:endParaRPr>
-          </a:p>
-          <a:p>
-            <a:pPr marL="241300" indent="-228600">
-              <a:lnSpc>
-                <a:spcPct val="100000"/>
-              </a:lnSpc>
-              <a:buFont typeface="Arial"/>
-              <a:buChar char="•"/>
-              <a:tabLst>
-                <a:tab pos="241300" algn="l"/>
-              </a:tabLst>
-            </a:pPr>
-            <a:endParaRPr lang="en-US" sz="3200" dirty="0">
-              <a:solidFill>
-                <a:srgbClr val="FFFFFF"/>
-              </a:solidFill>
-              <a:latin typeface="Century Gothic"/>
-              <a:cs typeface="Century Gothic"/>
-            </a:endParaRPr>
-          </a:p>
-          <a:p>
-            <a:pPr marL="241300" indent="-228600">
-              <a:lnSpc>
-                <a:spcPct val="100000"/>
-              </a:lnSpc>
-              <a:buFont typeface="Arial"/>
-              <a:buChar char="•"/>
-              <a:tabLst>
-                <a:tab pos="241300" algn="l"/>
-              </a:tabLst>
-            </a:pPr>
-            <a:r>
-              <a:rPr lang="en-US" sz="3200" dirty="0" smtClean="0">
-                <a:solidFill>
-                  <a:srgbClr val="FFFFFF"/>
-                </a:solidFill>
-                <a:latin typeface="Century Gothic"/>
-                <a:cs typeface="Century Gothic"/>
-              </a:rPr>
-              <a:t>Perform quality check on your codebase</a:t>
-            </a:r>
-          </a:p>
-          <a:p>
-            <a:pPr marL="241300" indent="-228600">
-              <a:lnSpc>
-                <a:spcPct val="100000"/>
-              </a:lnSpc>
-              <a:buFont typeface="Arial"/>
-              <a:buChar char="•"/>
-              <a:tabLst>
-                <a:tab pos="241300" algn="l"/>
-              </a:tabLst>
-            </a:pPr>
-            <a:endParaRPr lang="en-US" sz="3200" dirty="0">
-              <a:solidFill>
-                <a:srgbClr val="FFFFFF"/>
-              </a:solidFill>
-              <a:latin typeface="Century Gothic"/>
-              <a:cs typeface="Century Gothic"/>
-            </a:endParaRPr>
-          </a:p>
-          <a:p>
-            <a:pPr marL="241300" indent="-228600">
-              <a:lnSpc>
-                <a:spcPct val="100000"/>
-              </a:lnSpc>
-              <a:buFont typeface="Arial"/>
-              <a:buChar char="•"/>
-              <a:tabLst>
-                <a:tab pos="241300" algn="l"/>
-              </a:tabLst>
-            </a:pPr>
-            <a:r>
-              <a:rPr lang="en-US" sz="3200" dirty="0" smtClean="0">
-                <a:solidFill>
-                  <a:srgbClr val="FFFFFF"/>
-                </a:solidFill>
-                <a:latin typeface="Century Gothic"/>
-                <a:cs typeface="Century Gothic"/>
-              </a:rPr>
-              <a:t>Can be configured on your IDE</a:t>
-            </a:r>
-          </a:p>
-          <a:p>
-            <a:pPr marL="241300" indent="-228600">
-              <a:lnSpc>
-                <a:spcPct val="100000"/>
-              </a:lnSpc>
-              <a:buFont typeface="Arial"/>
-              <a:buChar char="•"/>
-              <a:tabLst>
-                <a:tab pos="241300" algn="l"/>
-              </a:tabLst>
-            </a:pPr>
-            <a:endParaRPr lang="en-US" sz="3200" dirty="0">
-              <a:solidFill>
-                <a:srgbClr val="FFFFFF"/>
-              </a:solidFill>
-              <a:latin typeface="Century Gothic"/>
-              <a:cs typeface="Century Gothic"/>
-            </a:endParaRPr>
-          </a:p>
-          <a:p>
-            <a:pPr marL="241300" indent="-228600">
-              <a:lnSpc>
-                <a:spcPct val="100000"/>
-              </a:lnSpc>
-              <a:buFont typeface="Arial"/>
-              <a:buChar char="•"/>
-              <a:tabLst>
-                <a:tab pos="241300" algn="l"/>
-              </a:tabLst>
-            </a:pPr>
-            <a:r>
-              <a:rPr lang="en-US" sz="3200" dirty="0" smtClean="0">
-                <a:solidFill>
-                  <a:srgbClr val="FFFFFF"/>
-                </a:solidFill>
-                <a:latin typeface="Century Gothic"/>
-                <a:cs typeface="Century Gothic"/>
-              </a:rPr>
-              <a:t>Examples </a:t>
-            </a:r>
-            <a:r>
-              <a:rPr lang="en-US" sz="3200" dirty="0" err="1" smtClean="0">
-                <a:solidFill>
-                  <a:srgbClr val="FFFFFF"/>
-                </a:solidFill>
-                <a:latin typeface="Century Gothic"/>
-                <a:cs typeface="Century Gothic"/>
-              </a:rPr>
-              <a:t>lints</a:t>
-            </a:r>
-            <a:r>
-              <a:rPr lang="en-US" sz="3200" dirty="0" smtClean="0">
-                <a:solidFill>
-                  <a:srgbClr val="FFFFFF"/>
-                </a:solidFill>
-                <a:latin typeface="Century Gothic"/>
-                <a:cs typeface="Century Gothic"/>
-              </a:rPr>
-              <a:t>: deprecations, new </a:t>
-            </a:r>
-            <a:r>
-              <a:rPr lang="en-US" sz="3200" dirty="0" err="1" smtClean="0">
-                <a:solidFill>
-                  <a:srgbClr val="FFFFFF"/>
-                </a:solidFill>
-                <a:latin typeface="Century Gothic"/>
-                <a:cs typeface="Century Gothic"/>
-              </a:rPr>
-              <a:t>apis</a:t>
-            </a:r>
-            <a:r>
-              <a:rPr lang="en-US" sz="3200" dirty="0" smtClean="0">
-                <a:solidFill>
-                  <a:srgbClr val="FFFFFF"/>
-                </a:solidFill>
-                <a:latin typeface="Century Gothic"/>
-                <a:cs typeface="Century Gothic"/>
-              </a:rPr>
-              <a:t>, security, performance, …</a:t>
-            </a:r>
-            <a:endParaRPr sz="3200" dirty="0">
-              <a:latin typeface="Century Gothic"/>
-              <a:cs typeface="Century Gothic"/>
-            </a:endParaRPr>
-          </a:p>
-        </p:txBody>
-      </p:sp>
-    </p:spTree>
-    <p:extLst>
-      <p:ext uri="{BB962C8B-B14F-4D97-AF65-F5344CB8AC3E}">
-        <p14:creationId xmlns:p14="http://schemas.microsoft.com/office/powerpoint/2010/main" val="2580361219"/>
-      </p:ext>
-    </p:extLst>
-  </p:cSld>
-  <p:clrMapOvr>
-    <a:masterClrMapping/>
-  </p:clrMapOvr>
-  <p:timing>
-    <p:tnLst>
-      <p:par>
-        <p:cTn id="1" dur="indefinite" restart="never" nodeType="tmRoot"/>
-      </p:par>
-    </p:tnLst>
-  </p:timing>
-</p:sld>
-</file>
-
-<file path=ppt/slides/slide12.xml><?xml version="1.0" encoding="utf-8"?>
-<p:sld xmlns:a="http://schemas.openxmlformats.org/drawingml/2006/main" xmlns:r="http://schemas.openxmlformats.org/officeDocument/2006/relationships" xmlns:p="http://schemas.openxmlformats.org/presentationml/2006/main">
-  <p:cSld>
-    <p:spTree>
-      <p:nvGrpSpPr>
-        <p:cNvPr id="1" name=""/>
-        <p:cNvGrpSpPr/>
-        <p:nvPr/>
-      </p:nvGrpSpPr>
-      <p:grpSpPr>
-        <a:xfrm>
-          <a:off x="0" y="0"/>
-          <a:ext cx="0" cy="0"/>
-          <a:chOff x="0" y="0"/>
-          <a:chExt cx="0" cy="0"/>
-        </a:xfrm>
-      </p:grpSpPr>
-      <p:sp>
-        <p:nvSpPr>
-          <p:cNvPr id="2" name="object 2"/>
-          <p:cNvSpPr txBox="1">
-            <a:spLocks noGrp="1"/>
-          </p:cNvSpPr>
-          <p:nvPr>
-            <p:ph type="title"/>
-          </p:nvPr>
-        </p:nvSpPr>
-        <p:spPr>
-          <a:xfrm>
             <a:off x="4538548" y="2960821"/>
             <a:ext cx="2693670" cy="533400"/>
           </a:xfrm>
@@ -3955,13 +3578,6 @@
   <p:clrMapOvr>
     <a:masterClrMapping/>
   </p:clrMapOvr>
-  <p:timing>
-    <p:tnLst>
-      <p:par>
-        <p:cTn id="1" dur="indefinite" restart="never" nodeType="tmRoot"/>
-      </p:par>
-    </p:tnLst>
-  </p:timing>
 </p:sld>
 </file>
 
@@ -4013,7 +3629,7 @@
               </a:lnSpc>
             </a:pPr>
             <a:r>
-              <a:rPr lang="en-US" spc="-5" dirty="0" smtClean="0">
+              <a:rPr lang="en-US" spc="-5" dirty="0">
                 <a:latin typeface="Century Gothic"/>
                 <a:cs typeface="Century Gothic"/>
               </a:rPr>
@@ -4058,7 +3674,7 @@
               </a:tabLst>
             </a:pPr>
             <a:r>
-              <a:rPr lang="en-US" sz="3200" dirty="0" smtClean="0">
+              <a:rPr lang="en-US" sz="3200" dirty="0">
                 <a:solidFill>
                   <a:srgbClr val="FFFFFF"/>
                 </a:solidFill>
@@ -4067,7 +3683,7 @@
               </a:rPr>
               <a:t>Reach deadlines</a:t>
             </a:r>
-            <a:endParaRPr sz="3200" dirty="0" smtClean="0">
+            <a:endParaRPr sz="3200" dirty="0">
               <a:latin typeface="Century Gothic"/>
               <a:cs typeface="Century Gothic"/>
             </a:endParaRPr>
@@ -4086,7 +3702,7 @@
               <a:buFont typeface="Arial"/>
               <a:buChar char="•"/>
             </a:pPr>
-            <a:endParaRPr sz="3400" dirty="0" smtClean="0">
+            <a:endParaRPr sz="3400" dirty="0">
               <a:latin typeface="Times New Roman"/>
               <a:cs typeface="Times New Roman"/>
             </a:endParaRPr>
@@ -4103,7 +3719,7 @@
               </a:tabLst>
             </a:pPr>
             <a:r>
-              <a:rPr lang="en-US" sz="3200" dirty="0" smtClean="0">
+              <a:rPr lang="en-US" sz="3200" dirty="0">
                 <a:solidFill>
                   <a:srgbClr val="FFFFFF"/>
                 </a:solidFill>
@@ -4113,7 +3729,7 @@
               <a:t>No enough time to do a </a:t>
             </a:r>
             <a:r>
-              <a:rPr lang="en-US" sz="3200" b="1" dirty="0" smtClean="0">
+              <a:rPr lang="en-US" sz="3200" b="1" dirty="0">
                 <a:solidFill>
                   <a:srgbClr val="FFFFFF"/>
                 </a:solidFill>
@@ -4123,7 +3739,7 @@
               <a:t>Good job</a:t>
             </a:r>
             <a:r>
-              <a:rPr lang="en-US" sz="3200" dirty="0" smtClean="0">
+              <a:rPr lang="en-US" sz="3200" dirty="0">
                 <a:solidFill>
                   <a:srgbClr val="FFFFFF"/>
                 </a:solidFill>
@@ -4168,7 +3784,7 @@
               </a:tabLst>
             </a:pPr>
             <a:r>
-              <a:rPr lang="en-US" sz="3200" dirty="0" smtClean="0">
+              <a:rPr lang="en-US" sz="3200" dirty="0">
                 <a:solidFill>
                   <a:srgbClr val="FFFFFF"/>
                 </a:solidFill>
@@ -4213,7 +3829,7 @@
               </a:tabLst>
             </a:pPr>
             <a:r>
-              <a:rPr lang="en-US" sz="3200" dirty="0" smtClean="0">
+              <a:rPr lang="en-US" sz="3200" dirty="0">
                 <a:solidFill>
                   <a:srgbClr val="FFFFFF"/>
                 </a:solidFill>
@@ -4258,13 +3874,6 @@
   <p:clrMapOvr>
     <a:masterClrMapping/>
   </p:clrMapOvr>
-  <p:timing>
-    <p:tnLst>
-      <p:par>
-        <p:cTn id="1" dur="indefinite" restart="never" nodeType="tmRoot"/>
-      </p:par>
-    </p:tnLst>
-  </p:timing>
 </p:sld>
 </file>
 
@@ -4317,15 +3926,7 @@
             </a:pPr>
             <a:r>
               <a:rPr lang="en-US" dirty="0"/>
-              <a:t>The Grand </a:t>
-            </a:r>
-            <a:r>
-              <a:rPr lang="en-US" dirty="0" smtClean="0"/>
-              <a:t>Redesign in </a:t>
-            </a:r>
-            <a:r>
-              <a:rPr lang="en-US" dirty="0"/>
-              <a:t>the Sky</a:t>
+              <a:t>The Grand Redesign in the Sky</a:t>
             </a:r>
             <a:endParaRPr spc="-5" dirty="0"/>
           </a:p>
@@ -4363,7 +3964,7 @@
               </a:tabLst>
             </a:pPr>
             <a:r>
-              <a:rPr lang="en-US" sz="3200" dirty="0" smtClean="0">
+              <a:rPr lang="en-US" sz="3200" dirty="0">
                 <a:solidFill>
                   <a:srgbClr val="FFFFFF"/>
                 </a:solidFill>
@@ -4408,54 +4009,7 @@
                 <a:latin typeface="Century Gothic"/>
                 <a:cs typeface="Century Gothic"/>
               </a:rPr>
-              <a:t>T</a:t>
-            </a:r>
-            <a:r>
-              <a:rPr lang="en-US" sz="3200" dirty="0" smtClean="0">
-                <a:solidFill>
-                  <a:schemeClr val="bg1"/>
-                </a:solidFill>
-                <a:latin typeface="Century Gothic"/>
-                <a:cs typeface="Century Gothic"/>
-              </a:rPr>
-              <a:t>iger team selected</a:t>
-            </a:r>
-          </a:p>
-          <a:p>
-            <a:pPr marL="12700">
-              <a:lnSpc>
-                <a:spcPct val="100000"/>
-              </a:lnSpc>
-              <a:tabLst>
-                <a:tab pos="241300" algn="l"/>
-              </a:tabLst>
-            </a:pPr>
-            <a:endParaRPr lang="en-US" sz="3200" dirty="0" smtClean="0">
-              <a:solidFill>
-                <a:schemeClr val="bg1"/>
-              </a:solidFill>
-              <a:latin typeface="Century Gothic"/>
-              <a:cs typeface="Century Gothic"/>
-            </a:endParaRPr>
-          </a:p>
-          <a:p>
-            <a:pPr marL="12700">
-              <a:lnSpc>
-                <a:spcPct val="100000"/>
-              </a:lnSpc>
-              <a:tabLst>
-                <a:tab pos="241300" algn="l"/>
-              </a:tabLst>
-            </a:pPr>
-            <a:r>
-              <a:rPr lang="en-US" sz="3200" dirty="0" smtClean="0">
-                <a:solidFill>
-                  <a:schemeClr val="bg1"/>
-                </a:solidFill>
-                <a:latin typeface="Century Gothic"/>
-                <a:cs typeface="Century Gothic"/>
-              </a:rPr>
-              <a:t>3. Maintain current system until new one is ready</a:t>
+              <a:t>Tiger team selected</a:t>
             </a:r>
           </a:p>
           <a:p>
@@ -4485,17 +4039,54 @@
               </a:tabLst>
             </a:pPr>
             <a:r>
-              <a:rPr lang="en-US" sz="3200" dirty="0" smtClean="0">
+              <a:rPr lang="en-US" sz="3200" dirty="0">
                 <a:solidFill>
                   <a:schemeClr val="bg1"/>
                 </a:solidFill>
                 <a:latin typeface="Century Gothic"/>
                 <a:cs typeface="Century Gothic"/>
               </a:rPr>
+              <a:t>3. Maintain current system until new one is ready</a:t>
+            </a:r>
+          </a:p>
+          <a:p>
+            <a:pPr marL="12700">
+              <a:lnSpc>
+                <a:spcPct val="100000"/>
+              </a:lnSpc>
+              <a:tabLst>
+                <a:tab pos="241300" algn="l"/>
+              </a:tabLst>
+            </a:pPr>
+            <a:endParaRPr lang="en-US" sz="3200" dirty="0">
+              <a:solidFill>
+                <a:schemeClr val="bg1"/>
+              </a:solidFill>
+              <a:latin typeface="Century Gothic"/>
+              <a:cs typeface="Century Gothic"/>
+            </a:endParaRPr>
+          </a:p>
+          <a:p>
+            <a:pPr marL="12700">
+              <a:lnSpc>
+                <a:spcPct val="100000"/>
+              </a:lnSpc>
+              <a:tabLst>
+                <a:tab pos="241300" algn="l"/>
+              </a:tabLst>
+            </a:pPr>
+            <a:r>
+              <a:rPr lang="en-US" sz="3200" dirty="0">
+                <a:solidFill>
+                  <a:schemeClr val="bg1"/>
+                </a:solidFill>
+                <a:latin typeface="Century Gothic"/>
+                <a:cs typeface="Century Gothic"/>
+              </a:rPr>
               <a:t>4. Redesign new system, </a:t>
             </a:r>
             <a:r>
-              <a:rPr lang="en-US" sz="3600" dirty="0" smtClean="0">
+              <a:rPr lang="en-US" sz="3600" dirty="0">
                 <a:solidFill>
                   <a:schemeClr val="bg1"/>
                 </a:solidFill>
@@ -4683,7 +4274,7 @@
               </a:lnSpc>
             </a:pPr>
             <a:r>
-              <a:rPr lang="en-US" spc="-5" dirty="0" smtClean="0">
+              <a:rPr lang="en-US" spc="-5" dirty="0">
                 <a:latin typeface="Century Gothic"/>
                 <a:cs typeface="Century Gothic"/>
               </a:rPr>
@@ -4728,34 +4319,14 @@
               </a:tabLst>
             </a:pPr>
             <a:r>
-              <a:rPr lang="en-US" sz="3200" dirty="0" smtClean="0">
+              <a:rPr lang="en-US" sz="3200" dirty="0">
                 <a:solidFill>
                   <a:srgbClr val="FFFFFF"/>
                 </a:solidFill>
                 <a:latin typeface="Century Gothic"/>
                 <a:cs typeface="Century Gothic"/>
               </a:rPr>
-              <a:t>Clean </a:t>
-            </a:r>
-            <a:r>
-              <a:rPr lang="en-US" sz="3200" dirty="0">
-                <a:solidFill>
-                  <a:srgbClr val="FFFFFF"/>
-                </a:solidFill>
-                <a:latin typeface="Century Gothic"/>
-                <a:cs typeface="Century Gothic"/>
-              </a:rPr>
-              <a:t>code is pleasing to </a:t>
-            </a:r>
-            <a:r>
-              <a:rPr lang="en-US" sz="3200" dirty="0" smtClean="0">
-                <a:solidFill>
-                  <a:srgbClr val="FFFFFF"/>
-                </a:solidFill>
-                <a:latin typeface="Century Gothic"/>
-                <a:cs typeface="Century Gothic"/>
-              </a:rPr>
-              <a:t>read</a:t>
+              <a:t>Clean code is pleasing to read</a:t>
             </a:r>
           </a:p>
           <a:p>
@@ -4796,17 +4367,7 @@
                 <a:latin typeface="Century Gothic"/>
                 <a:cs typeface="Century Gothic"/>
               </a:rPr>
-              <a:t>Bad code tempts the mess to </a:t>
-            </a:r>
-            <a:r>
-              <a:rPr lang="en-US" sz="3200" dirty="0" smtClean="0">
-                <a:solidFill>
-                  <a:srgbClr val="FFFFFF"/>
-                </a:solidFill>
-                <a:latin typeface="Century Gothic"/>
-                <a:cs typeface="Century Gothic"/>
-              </a:rPr>
-              <a:t>grow !</a:t>
+              <a:t>Bad code tempts the mess to grow !</a:t>
             </a:r>
             <a:endParaRPr sz="3200" dirty="0">
               <a:latin typeface="Century Gothic"/>
@@ -4861,18 +4422,13 @@
           <a:lstStyle/>
           <a:p>
             <a:r>
-              <a:rPr lang="en-US" sz="2000" dirty="0" smtClean="0">
+              <a:rPr lang="en-US" sz="2000" dirty="0">
                 <a:solidFill>
                   <a:schemeClr val="bg1"/>
                 </a:solidFill>
               </a:rPr>
               <a:t>Inventor of C++</a:t>
             </a:r>
-            <a:endParaRPr lang="en-US" sz="2000" dirty="0">
-              <a:solidFill>
-                <a:schemeClr val="bg1"/>
-              </a:solidFill>
-            </a:endParaRPr>
           </a:p>
         </p:txBody>
       </p:sp>
@@ -4934,13 +4490,6 @@
   <p:clrMapOvr>
     <a:masterClrMapping/>
   </p:clrMapOvr>
-  <p:timing>
-    <p:tnLst>
-      <p:par>
-        <p:cTn id="1" dur="indefinite" restart="never" nodeType="tmRoot"/>
-      </p:par>
-    </p:tnLst>
-  </p:timing>
 </p:sld>
 </file>
 
@@ -4992,7 +4541,7 @@
               </a:lnSpc>
             </a:pPr>
             <a:r>
-              <a:rPr lang="en-US" spc="-5" dirty="0" smtClean="0">
+              <a:rPr lang="en-US" spc="-5" dirty="0">
                 <a:latin typeface="Century Gothic"/>
                 <a:cs typeface="Century Gothic"/>
               </a:rPr>
@@ -5056,13 +4605,6 @@
   <p:clrMapOvr>
     <a:masterClrMapping/>
   </p:clrMapOvr>
-  <p:timing>
-    <p:tnLst>
-      <p:par>
-        <p:cTn id="1" dur="indefinite" restart="never" nodeType="tmRoot"/>
-      </p:par>
-    </p:tnLst>
-  </p:timing>
 </p:sld>
 </file>
 
@@ -5114,7 +4656,7 @@
               </a:lnSpc>
             </a:pPr>
             <a:r>
-              <a:rPr lang="en-US" spc="-5" dirty="0" smtClean="0">
+              <a:rPr lang="en-US" spc="-5" dirty="0">
                 <a:latin typeface="Century Gothic"/>
                 <a:cs typeface="Century Gothic"/>
               </a:rPr>
@@ -5159,16 +4701,16 @@
               </a:tabLst>
             </a:pPr>
             <a:r>
-              <a:rPr lang="en-US" sz="3200" dirty="0" smtClean="0">
+              <a:rPr lang="en-US" sz="3200" dirty="0">
                 <a:solidFill>
                   <a:srgbClr val="FFFFFF"/>
                 </a:solidFill>
                 <a:latin typeface="Century Gothic"/>
                 <a:cs typeface="Century Gothic"/>
               </a:rPr>
-              <a:t>Our </a:t>
-            </a:r>
-            <a:r>
+              <a:t>Our code should contain only</a:t>
+            </a:r>
+            <a:br>
               <a:rPr lang="en-US" sz="3200" dirty="0">
                 <a:solidFill>
                   <a:srgbClr val="FFFFFF"/>
@@ -5176,56 +4718,16 @@
                 <a:latin typeface="Century Gothic"/>
                 <a:cs typeface="Century Gothic"/>
               </a:rPr>
-              <a:t>code should contain </a:t>
-            </a:r>
-            <a:r>
-              <a:rPr lang="en-US" sz="3200" dirty="0" smtClean="0">
+            </a:br>
+            <a:r>
+              <a:rPr lang="en-US" sz="3200" dirty="0">
                 <a:solidFill>
                   <a:srgbClr val="FFFFFF"/>
                 </a:solidFill>
                 <a:latin typeface="Century Gothic"/>
                 <a:cs typeface="Century Gothic"/>
               </a:rPr>
-              <a:t>only</a:t>
-            </a:r>
-            <a:br>
-              <a:rPr lang="en-US" sz="3200" dirty="0" smtClean="0">
-                <a:solidFill>
-                  <a:srgbClr val="FFFFFF"/>
-                </a:solidFill>
-                <a:latin typeface="Century Gothic"/>
-                <a:cs typeface="Century Gothic"/>
-              </a:rPr>
-            </a:br>
-            <a:r>
-              <a:rPr lang="en-US" sz="3200" dirty="0" smtClean="0">
-                <a:solidFill>
-                  <a:srgbClr val="FFFFFF"/>
-                </a:solidFill>
-                <a:latin typeface="Century Gothic"/>
-                <a:cs typeface="Century Gothic"/>
-              </a:rPr>
-              <a:t> </a:t>
-            </a:r>
-            <a:r>
-              <a:rPr lang="en-US" sz="3200" dirty="0">
-                <a:solidFill>
-                  <a:srgbClr val="FFFFFF"/>
-                </a:solidFill>
-                <a:latin typeface="Century Gothic"/>
-                <a:cs typeface="Century Gothic"/>
-              </a:rPr>
-              <a:t>what is </a:t>
-            </a:r>
-            <a:r>
-              <a:rPr lang="en-US" sz="3200" dirty="0" smtClean="0">
-                <a:solidFill>
-                  <a:srgbClr val="FFFFFF"/>
-                </a:solidFill>
-                <a:latin typeface="Century Gothic"/>
-                <a:cs typeface="Century Gothic"/>
-              </a:rPr>
-              <a:t>necessary</a:t>
+              <a:t> what is necessary</a:t>
             </a:r>
             <a:endParaRPr lang="en-US" sz="3200" dirty="0">
               <a:latin typeface="Century Gothic"/>
@@ -5263,16 +4765,16 @@
               </a:tabLst>
             </a:pPr>
             <a:r>
-              <a:rPr lang="en-US" sz="3200" dirty="0" smtClean="0">
+              <a:rPr lang="en-US" sz="3200" dirty="0">
                 <a:solidFill>
                   <a:srgbClr val="FFFFFF"/>
                 </a:solidFill>
                 <a:latin typeface="Century Gothic"/>
                 <a:cs typeface="Century Gothic"/>
               </a:rPr>
-              <a:t>Clean </a:t>
-            </a:r>
-            <a:r>
+              <a:t>Clean code should read like </a:t>
+            </a:r>
+            <a:br>
               <a:rPr lang="en-US" sz="3200" dirty="0">
                 <a:solidFill>
                   <a:srgbClr val="FFFFFF"/>
@@ -5280,29 +4782,9 @@
                 <a:latin typeface="Century Gothic"/>
                 <a:cs typeface="Century Gothic"/>
               </a:rPr>
-              <a:t>code should read like </a:t>
-            </a:r>
-            <a:r>
-              <a:rPr lang="en-US" sz="3200" dirty="0" smtClean="0">
-                <a:solidFill>
-                  <a:srgbClr val="FFFFFF"/>
-                </a:solidFill>
-                <a:latin typeface="Century Gothic"/>
-                <a:cs typeface="Century Gothic"/>
-              </a:rPr>
-              <a:t/>
-            </a:r>
-            <a:br>
-              <a:rPr lang="en-US" sz="3200" dirty="0" smtClean="0">
-                <a:solidFill>
-                  <a:srgbClr val="FFFFFF"/>
-                </a:solidFill>
-                <a:latin typeface="Century Gothic"/>
-                <a:cs typeface="Century Gothic"/>
-              </a:rPr>
             </a:br>
             <a:r>
-              <a:rPr lang="en-US" sz="3200" dirty="0" smtClean="0">
+              <a:rPr lang="en-US" sz="3200" dirty="0">
                 <a:solidFill>
                   <a:srgbClr val="FFFFFF"/>
                 </a:solidFill>
@@ -5416,18 +4898,13 @@
           <a:lstStyle/>
           <a:p>
             <a:r>
-              <a:rPr lang="en-US" dirty="0" smtClean="0">
+              <a:rPr lang="en-US" dirty="0">
                 <a:solidFill>
                   <a:schemeClr val="bg1"/>
                 </a:solidFill>
               </a:rPr>
               <a:t>Author of OOP</a:t>
             </a:r>
-            <a:endParaRPr lang="en-US" dirty="0">
-              <a:solidFill>
-                <a:schemeClr val="bg1"/>
-              </a:solidFill>
-            </a:endParaRPr>
           </a:p>
         </p:txBody>
       </p:sp>
@@ -5441,13 +4918,6 @@
   <p:clrMapOvr>
     <a:masterClrMapping/>
   </p:clrMapOvr>
-  <p:timing>
-    <p:tnLst>
-      <p:par>
-        <p:cTn id="1" dur="indefinite" restart="never" nodeType="tmRoot"/>
-      </p:par>
-    </p:tnLst>
-  </p:timing>
 </p:sld>
 </file>
 
@@ -5499,7 +4969,7 @@
               </a:lnSpc>
             </a:pPr>
             <a:r>
-              <a:rPr lang="en-US" spc="-5" dirty="0" smtClean="0">
+              <a:rPr lang="en-US" spc="-5" dirty="0">
                 <a:latin typeface="Century Gothic"/>
                 <a:cs typeface="Century Gothic"/>
               </a:rPr>
@@ -5544,54 +5014,34 @@
               </a:tabLst>
             </a:pPr>
             <a:r>
-              <a:rPr lang="en-US" sz="3200" dirty="0" smtClean="0">
+              <a:rPr lang="en-US" sz="3200" dirty="0">
                 <a:solidFill>
                   <a:srgbClr val="FFFFFF"/>
                 </a:solidFill>
                 <a:latin typeface="Century Gothic"/>
                 <a:cs typeface="Century Gothic"/>
               </a:rPr>
-              <a:t>Clean </a:t>
-            </a:r>
-            <a:r>
-              <a:rPr lang="en-US" sz="3200" dirty="0">
-                <a:solidFill>
-                  <a:srgbClr val="FFFFFF"/>
+              <a:t>Clean code makes it easy for other people to </a:t>
+            </a:r>
+            <a:r>
+              <a:rPr lang="en-US" sz="3200" b="1" dirty="0">
+                <a:solidFill>
+                  <a:schemeClr val="bg1"/>
                 </a:solidFill>
                 <a:latin typeface="Century Gothic"/>
                 <a:cs typeface="Century Gothic"/>
               </a:rPr>
-              <a:t>code makes it easy for other people to </a:t>
-            </a:r>
-            <a:r>
-              <a:rPr lang="en-US" sz="3200" b="1" dirty="0">
-                <a:solidFill>
-                  <a:schemeClr val="bg1"/>
+              <a:t>enhance</a:t>
+            </a:r>
+            <a:r>
+              <a:rPr lang="en-US" sz="3200" dirty="0">
+                <a:solidFill>
+                  <a:srgbClr val="FFFFFF"/>
                 </a:solidFill>
                 <a:latin typeface="Century Gothic"/>
                 <a:cs typeface="Century Gothic"/>
               </a:rPr>
-              <a:t>enhance</a:t>
-            </a:r>
-            <a:r>
-              <a:rPr lang="en-US" sz="3200" dirty="0">
-                <a:solidFill>
-                  <a:srgbClr val="FFFFFF"/>
-                </a:solidFill>
-                <a:latin typeface="Century Gothic"/>
-                <a:cs typeface="Century Gothic"/>
-              </a:rPr>
-              <a:t> </a:t>
-            </a:r>
-            <a:r>
-              <a:rPr lang="en-US" sz="3200" dirty="0" smtClean="0">
-                <a:solidFill>
-                  <a:srgbClr val="FFFFFF"/>
-                </a:solidFill>
-                <a:latin typeface="Century Gothic"/>
-                <a:cs typeface="Century Gothic"/>
-              </a:rPr>
-              <a:t>it</a:t>
+              <a:t> it</a:t>
             </a:r>
           </a:p>
           <a:p>
@@ -5625,24 +5075,14 @@
               </a:tabLst>
             </a:pPr>
             <a:r>
-              <a:rPr lang="en-US" sz="3200" dirty="0" smtClean="0">
+              <a:rPr lang="en-US" sz="3200" dirty="0">
                 <a:solidFill>
                   <a:srgbClr val="FFFFFF"/>
                 </a:solidFill>
                 <a:latin typeface="Century Gothic"/>
                 <a:cs typeface="Century Gothic"/>
               </a:rPr>
-              <a:t>Smaller </a:t>
-            </a:r>
-            <a:r>
-              <a:rPr lang="en-US" sz="3200" dirty="0">
-                <a:solidFill>
-                  <a:srgbClr val="FFFFFF"/>
-                </a:solidFill>
-                <a:latin typeface="Century Gothic"/>
-                <a:cs typeface="Century Gothic"/>
-              </a:rPr>
-              <a:t>codebase the better</a:t>
+              <a:t>Smaller codebase the better</a:t>
             </a:r>
           </a:p>
         </p:txBody>
@@ -5727,18 +5167,13 @@
           <a:lstStyle/>
           <a:p>
             <a:r>
-              <a:rPr lang="en-US" dirty="0" smtClean="0">
+              <a:rPr lang="en-US" dirty="0">
                 <a:solidFill>
                   <a:schemeClr val="bg1"/>
                 </a:solidFill>
               </a:rPr>
               <a:t>CEO of Eclipse project</a:t>
             </a:r>
-            <a:endParaRPr lang="en-US" dirty="0">
-              <a:solidFill>
-                <a:schemeClr val="bg1"/>
-              </a:solidFill>
-            </a:endParaRPr>
           </a:p>
         </p:txBody>
       </p:sp>
@@ -5752,13 +5187,6 @@
   <p:clrMapOvr>
     <a:masterClrMapping/>
   </p:clrMapOvr>
-  <p:timing>
-    <p:tnLst>
-      <p:par>
-        <p:cTn id="1" dur="indefinite" restart="never" nodeType="tmRoot"/>
-      </p:par>
-    </p:tnLst>
-  </p:timing>
 </p:sld>
 </file>
 
@@ -5810,7 +5238,7 @@
               </a:lnSpc>
             </a:pPr>
             <a:r>
-              <a:rPr lang="en-US" spc="-5" dirty="0" smtClean="0">
+              <a:rPr lang="en-US" spc="-5" dirty="0">
                 <a:latin typeface="Century Gothic"/>
                 <a:cs typeface="Century Gothic"/>
               </a:rPr>
@@ -5864,35 +5292,34 @@
               </a:rPr>
               <a:t>Duplicate code is a sign </a:t>
             </a:r>
-            <a:r>
-              <a:rPr lang="en-US" sz="3200" dirty="0" smtClean="0">
+            <a:br>
+              <a:rPr lang="en-US" sz="3200" dirty="0">
                 <a:solidFill>
                   <a:srgbClr val="FFFFFF"/>
                 </a:solidFill>
                 <a:latin typeface="Century Gothic"/>
                 <a:cs typeface="Century Gothic"/>
               </a:rPr>
-              <a:t/>
-            </a:r>
-            <a:br>
-              <a:rPr lang="en-US" sz="3200" dirty="0" smtClean="0">
+            </a:br>
+            <a:r>
+              <a:rPr lang="en-US" sz="3200" dirty="0">
                 <a:solidFill>
                   <a:srgbClr val="FFFFFF"/>
                 </a:solidFill>
                 <a:latin typeface="Century Gothic"/>
                 <a:cs typeface="Century Gothic"/>
               </a:rPr>
-            </a:br>
-            <a:r>
-              <a:rPr lang="en-US" sz="3200" dirty="0" smtClean="0">
+              <a:t>there is an idea in our mind </a:t>
+            </a:r>
+            <a:br>
+              <a:rPr lang="en-US" sz="3200" dirty="0">
                 <a:solidFill>
                   <a:srgbClr val="FFFFFF"/>
                 </a:solidFill>
                 <a:latin typeface="Century Gothic"/>
                 <a:cs typeface="Century Gothic"/>
               </a:rPr>
-              <a:t>there </a:t>
-            </a:r>
+            </a:br>
             <a:r>
               <a:rPr lang="en-US" sz="3200" dirty="0">
                 <a:solidFill>
@@ -5901,56 +5328,7 @@
                 <a:latin typeface="Century Gothic"/>
                 <a:cs typeface="Century Gothic"/>
               </a:rPr>
-              <a:t>is an idea in our mind </a:t>
-            </a:r>
-            <a:r>
-              <a:rPr lang="en-US" sz="3200" dirty="0" smtClean="0">
-                <a:solidFill>
-                  <a:srgbClr val="FFFFFF"/>
-                </a:solidFill>
-                <a:latin typeface="Century Gothic"/>
-                <a:cs typeface="Century Gothic"/>
-              </a:rPr>
-              <a:t/>
-            </a:r>
-            <a:br>
-              <a:rPr lang="en-US" sz="3200" dirty="0" smtClean="0">
-                <a:solidFill>
-                  <a:srgbClr val="FFFFFF"/>
-                </a:solidFill>
-                <a:latin typeface="Century Gothic"/>
-                <a:cs typeface="Century Gothic"/>
-              </a:rPr>
-            </a:br>
-            <a:r>
-              <a:rPr lang="en-US" sz="3200" dirty="0" smtClean="0">
-                <a:solidFill>
-                  <a:srgbClr val="FFFFFF"/>
-                </a:solidFill>
-                <a:latin typeface="Century Gothic"/>
-                <a:cs typeface="Century Gothic"/>
-              </a:rPr>
-              <a:t>that </a:t>
-            </a:r>
-            <a:r>
-              <a:rPr lang="en-US" sz="3200" dirty="0">
-                <a:solidFill>
-                  <a:srgbClr val="FFFFFF"/>
-                </a:solidFill>
-                <a:latin typeface="Century Gothic"/>
-                <a:cs typeface="Century Gothic"/>
-              </a:rPr>
-              <a:t>is not well represented in </a:t>
-            </a:r>
-            <a:r>
-              <a:rPr lang="en-US" sz="3200" dirty="0" smtClean="0">
-                <a:solidFill>
-                  <a:srgbClr val="FFFFFF"/>
-                </a:solidFill>
-                <a:latin typeface="Century Gothic"/>
-                <a:cs typeface="Century Gothic"/>
-              </a:rPr>
-              <a:t>the code</a:t>
+              <a:t>that is not well represented in the code</a:t>
             </a:r>
             <a:endParaRPr sz="3200" dirty="0">
               <a:latin typeface="Century Gothic"/>
@@ -6039,18 +5417,13 @@
           <a:lstStyle/>
           <a:p>
             <a:r>
-              <a:rPr lang="en-US" dirty="0" smtClean="0">
+              <a:rPr lang="en-US" dirty="0">
                 <a:solidFill>
                   <a:schemeClr val="bg1"/>
                 </a:solidFill>
               </a:rPr>
               <a:t>Extreme Programming in C#</a:t>
             </a:r>
-            <a:endParaRPr lang="en-US" dirty="0">
-              <a:solidFill>
-                <a:schemeClr val="bg1"/>
-              </a:solidFill>
-            </a:endParaRPr>
           </a:p>
         </p:txBody>
       </p:sp>
@@ -6064,13 +5437,6 @@
   <p:clrMapOvr>
     <a:masterClrMapping/>
   </p:clrMapOvr>
-  <p:timing>
-    <p:tnLst>
-      <p:par>
-        <p:cTn id="1" dur="indefinite" restart="never" nodeType="tmRoot"/>
-      </p:par>
-    </p:tnLst>
-  </p:timing>
 </p:sld>
 </file>
 
@@ -6207,42 +5573,15 @@
               <a:buChar char="•"/>
             </a:pPr>
             <a:r>
-              <a:rPr lang="en-US" sz="3200" dirty="0" smtClean="0">
+              <a:rPr lang="en-US" sz="3200" dirty="0">
                 <a:solidFill>
                   <a:srgbClr val="FFFFFF"/>
                 </a:solidFill>
                 <a:latin typeface="Century Gothic"/>
                 <a:cs typeface="Century Gothic"/>
               </a:rPr>
-              <a:t> Change </a:t>
-            </a:r>
-            <a:r>
-              <a:rPr lang="en-US" sz="3200" dirty="0">
-                <a:solidFill>
-                  <a:srgbClr val="FFFFFF"/>
-                </a:solidFill>
-                <a:latin typeface="Century Gothic"/>
-                <a:cs typeface="Century Gothic"/>
-              </a:rPr>
-              <a:t>one variable name for the </a:t>
-            </a:r>
-            <a:r>
-              <a:rPr lang="en-US" sz="3200" dirty="0" smtClean="0">
-                <a:solidFill>
-                  <a:srgbClr val="FFFFFF"/>
-                </a:solidFill>
-                <a:latin typeface="Century Gothic"/>
-                <a:cs typeface="Century Gothic"/>
-              </a:rPr>
-              <a:t>better</a:t>
-            </a:r>
-            <a:endParaRPr lang="en-US" sz="3200" dirty="0">
-              <a:solidFill>
-                <a:srgbClr val="FFFFFF"/>
-              </a:solidFill>
-              <a:latin typeface="Century Gothic"/>
-              <a:cs typeface="Century Gothic"/>
-            </a:endParaRPr>
+              <a:t> Change one variable name for the better</a:t>
+            </a:r>
           </a:p>
           <a:p>
             <a:pPr marL="342900" fontAlgn="ctr">
@@ -6250,62 +5589,15 @@
               <a:buChar char="•"/>
             </a:pPr>
             <a:r>
-              <a:rPr lang="en-US" sz="3200" dirty="0" smtClean="0">
+              <a:rPr lang="en-US" sz="3200" dirty="0">
                 <a:solidFill>
                   <a:srgbClr val="FFFFFF"/>
                 </a:solidFill>
                 <a:latin typeface="Century Gothic"/>
                 <a:cs typeface="Century Gothic"/>
               </a:rPr>
-              <a:t> Break </a:t>
-            </a:r>
-            <a:r>
-              <a:rPr lang="en-US" sz="3200" dirty="0">
-                <a:solidFill>
-                  <a:srgbClr val="FFFFFF"/>
-                </a:solidFill>
-                <a:latin typeface="Century Gothic"/>
-                <a:cs typeface="Century Gothic"/>
-              </a:rPr>
-              <a:t>up </a:t>
-            </a:r>
-            <a:r>
-              <a:rPr lang="en-US" sz="3200" dirty="0" smtClean="0">
-                <a:solidFill>
-                  <a:srgbClr val="FFFFFF"/>
-                </a:solidFill>
-                <a:latin typeface="Century Gothic"/>
-                <a:cs typeface="Century Gothic"/>
-              </a:rPr>
-              <a:t>a </a:t>
-            </a:r>
-            <a:r>
-              <a:rPr lang="en-US" sz="3200" dirty="0">
-                <a:solidFill>
-                  <a:srgbClr val="FFFFFF"/>
-                </a:solidFill>
-                <a:latin typeface="Century Gothic"/>
-                <a:cs typeface="Century Gothic"/>
-              </a:rPr>
-              <a:t>function that’s a little too </a:t>
-            </a:r>
-            <a:r>
-              <a:rPr lang="en-US" sz="3200" dirty="0" smtClean="0">
-                <a:solidFill>
-                  <a:srgbClr val="FFFFFF"/>
-                </a:solidFill>
-                <a:latin typeface="Century Gothic"/>
-                <a:cs typeface="Century Gothic"/>
-              </a:rPr>
-              <a:t>large</a:t>
-            </a:r>
-            <a:endParaRPr lang="en-US" sz="3200" dirty="0">
-              <a:solidFill>
-                <a:srgbClr val="FFFFFF"/>
-              </a:solidFill>
-              <a:latin typeface="Century Gothic"/>
-              <a:cs typeface="Century Gothic"/>
-            </a:endParaRPr>
+              <a:t> Break up a function that’s a little too large</a:t>
+            </a:r>
           </a:p>
           <a:p>
             <a:pPr marL="342900" fontAlgn="ctr">
@@ -6313,24 +5605,14 @@
               <a:buChar char="•"/>
             </a:pPr>
             <a:r>
-              <a:rPr lang="en-US" sz="3200" dirty="0" smtClean="0">
+              <a:rPr lang="en-US" sz="3200" dirty="0">
                 <a:solidFill>
                   <a:srgbClr val="FFFFFF"/>
                 </a:solidFill>
                 <a:latin typeface="Century Gothic"/>
                 <a:cs typeface="Century Gothic"/>
               </a:rPr>
-              <a:t> Eliminate small </a:t>
-            </a:r>
-            <a:r>
-              <a:rPr lang="en-US" sz="3200" dirty="0">
-                <a:solidFill>
-                  <a:srgbClr val="FFFFFF"/>
-                </a:solidFill>
-                <a:latin typeface="Century Gothic"/>
-                <a:cs typeface="Century Gothic"/>
-              </a:rPr>
-              <a:t>bit of duplication</a:t>
+              <a:t> Eliminate small bit of duplication</a:t>
             </a:r>
           </a:p>
           <a:p>
@@ -6339,7 +5621,7 @@
               <a:buChar char="•"/>
             </a:pPr>
             <a:r>
-              <a:rPr lang="en-US" sz="3200" dirty="0" smtClean="0">
+              <a:rPr lang="en-US" sz="3200" dirty="0">
                 <a:solidFill>
                   <a:srgbClr val="FFFFFF"/>
                 </a:solidFill>
@@ -6348,13 +5630,6 @@
               </a:rPr>
               <a:t> Clean up one composite if statement</a:t>
             </a:r>
-            <a:endParaRPr lang="en-US" sz="3200" dirty="0">
-              <a:solidFill>
-                <a:srgbClr val="FFFFFF"/>
-              </a:solidFill>
-              <a:latin typeface="Century Gothic"/>
-              <a:cs typeface="Century Gothic"/>
-            </a:endParaRPr>
           </a:p>
         </p:txBody>
       </p:sp>
@@ -6409,13 +5684,6 @@
   <p:clrMapOvr>
     <a:masterClrMapping/>
   </p:clrMapOvr>
-  <p:timing>
-    <p:tnLst>
-      <p:par>
-        <p:cTn id="1" dur="indefinite" restart="never" nodeType="tmRoot"/>
-      </p:par>
-    </p:tnLst>
-  </p:timing>
 </p:sld>
 </file>
 

</xml_diff>